<commit_message>
alameda extension to cloud environment
</commit_message>
<xml_diff>
--- a/doc/alameda.pptx
+++ b/doc/alameda.pptx
@@ -3984,7 +3984,7 @@
             </a:r>
             <a:r>
               <a:rPr lang="en-US" altLang="zh-CN" dirty="0" err="1" smtClean="0"/>
-              <a:t>datestore</a:t>
+              <a:t>datastore</a:t>
             </a:r>
             <a:endParaRPr lang="zh-CN" altLang="en-US" dirty="0"/>
           </a:p>
@@ -4205,10 +4205,9 @@
           </a:lstStyle>
           <a:p>
             <a:r>
-              <a:rPr lang="en-US" altLang="zh-CN" sz="1800" dirty="0" err="1" smtClean="0"/>
-              <a:t>Connnection</a:t>
-            </a:r>
-            <a:endParaRPr lang="en-US" altLang="zh-CN" sz="1800" dirty="0" smtClean="0"/>
+              <a:rPr lang="en-US" altLang="zh-CN" sz="1800" dirty="0" smtClean="0"/>
+              <a:t>Connection</a:t>
+            </a:r>
           </a:p>
           <a:p>
             <a:r>

</xml_diff>